<commit_message>
Updated PowerPoint versions to newest version.
</commit_message>
<xml_diff>
--- a/presentation_applications.pptx
+++ b/presentation_applications.pptx
@@ -180,7 +180,7 @@
           <a:bodyPr anchor="b" bIns="0" lIns="0" rIns="0" tIns="0" wrap="none"/>
           <a:p>
             <a:pPr algn="r"/>
-            <a:fld id="{EF426681-83DB-4BAD-BCD3-BFF60FD9BBCF}" type="slidenum">
+            <a:fld id="{C3CC322C-CB14-4FA4-B2F6-815046CBE2ED}" type="slidenum">
               <a:rPr lang="en-GB" sz="1400"/>
               <a:t>&lt;number&gt;</a:t>
             </a:fld>
@@ -276,6 +276,80 @@
         <p:spPr>
           <a:xfrm>
             <a:off x="756000" y="5078520"/>
+            <a:ext cx="6047640" cy="5229000"/>
+          </a:xfrm>
+          <a:prstGeom prst="rect">
+            <a:avLst/>
+          </a:prstGeom>
+        </p:spPr>
+        <p:txBody>
+          <a:bodyPr bIns="0" lIns="0" rIns="0" tIns="0" wrap="none"/>
+          <a:p>
+            <a:r>
+              <a:rPr lang="en-GB"/>
+              <a:t>Optical character recognition – algorithms for this usually did a whole bunch of stuff before being able to recognise a character, including smoothing, curve analysis etc. This took a lot of processing power for the time, and could cause delays in recognition time, which wasn't very good for commercial environments, since speed is crucial there. </a:t>
+            </a:r>
+            <a:endParaRPr/>
+          </a:p>
+          <a:p>
+            <a:endParaRPr/>
+          </a:p>
+          <a:p>
+            <a:r>
+              <a:rPr lang="en-GB"/>
+              <a:t>So, neural networks were seen as an alternative since they could do without so much processing. They could actually be used with the back propagation algorithm, which does have the downside of being quite fiddly to get the right environment, since you need to to adjust the learning rate, number of layers, number of nodes and so forth, but this is one time only and once this is done it's an effective to recognise characters</a:t>
+            </a:r>
+            <a:endParaRPr/>
+          </a:p>
+          <a:p>
+            <a:endParaRPr/>
+          </a:p>
+          <a:p>
+            <a:endParaRPr/>
+          </a:p>
+          <a:p>
+            <a:endParaRPr/>
+          </a:p>
+          <a:p>
+            <a:endParaRPr/>
+          </a:p>
+        </p:txBody>
+      </p:sp>
+    </p:spTree>
+  </p:cSld>
+</p:notes>
+</file>
+
+<file path=ppt/notesSlides/notesSlide4.xml><?xml version="1.0" encoding="utf-8"?>
+<p:notes xmlns:a="http://schemas.openxmlformats.org/drawingml/2006/main" xmlns:p="http://schemas.openxmlformats.org/presentationml/2006/main" xmlns:r="http://schemas.openxmlformats.org/officeDocument/2006/relationships">
+  <p:cSld>
+    <p:spTree>
+      <p:nvGrpSpPr>
+        <p:cNvPr id="1" name=""/>
+        <p:cNvGrpSpPr/>
+        <p:nvPr/>
+      </p:nvGrpSpPr>
+      <p:grpSpPr>
+        <a:xfrm>
+          <a:off x="0" y="0"/>
+          <a:ext cx="0" cy="0"/>
+          <a:chOff x="0" y="0"/>
+          <a:chExt cx="0" cy="0"/>
+        </a:xfrm>
+      </p:grpSpPr>
+      <p:sp>
+        <p:nvSpPr>
+          <p:cNvPr id="60" name="PlaceHolder 1"/>
+          <p:cNvSpPr>
+            <a:spLocks noGrp="1"/>
+          </p:cNvSpPr>
+          <p:nvPr>
+            <p:ph type="body"/>
+          </p:nvPr>
+        </p:nvSpPr>
+        <p:spPr>
+          <a:xfrm>
+            <a:off x="756000" y="5078520"/>
             <a:ext cx="6047640" cy="4811040"/>
           </a:xfrm>
           <a:prstGeom prst="rect">
@@ -287,7 +361,14 @@
           <a:p>
             <a:r>
               <a:rPr lang="en-GB"/>
-              <a:t>Speed crucial in a commercial environment</a:t>
+              <a:t>Image compression – this can be done with neural networks because you can decompose an image into vectors, using brightness or colour perhaps. Once this is done, the vector quantisation method can be used, and that has some different algorithms such as competitive learning or using self-organising feature map.</a:t>
+            </a:r>
+            <a:endParaRPr/>
+          </a:p>
+          <a:p>
+            <a:r>
+              <a:rPr lang="en-GB"/>
+              <a:t>There are actually other ways aside from vector quantisation that can be used with a neural network, such as Hebbian learning, predictive coding or once again back-propagation, which can adapt to each given image with a specially designed network, so you can optimise specifically for each image.</a:t>
             </a:r>
             <a:endParaRPr/>
           </a:p>
@@ -317,7 +398,7 @@
       </p:grpSpPr>
       <p:sp>
         <p:nvSpPr>
-          <p:cNvPr id="60" name="PlaceHolder 1"/>
+          <p:cNvPr id="61" name="PlaceHolder 1"/>
           <p:cNvSpPr>
             <a:spLocks noGrp="1"/>
           </p:cNvSpPr>
@@ -337,62 +418,16 @@
         <p:txBody>
           <a:bodyPr bIns="0" lIns="0" rIns="0" tIns="0" wrap="none"/>
           <a:p>
-            <a:pPr>
-              <a:buSzPct val="45000"/>
-              <a:buFont typeface="StarSymbol"/>
-              <a:buChar char=""/>
-            </a:pPr>
-            <a:r>
-              <a:rPr lang="en-GB"/>
-              <a:t>Why</a:t>
-            </a:r>
-            <a:endParaRPr/>
-          </a:p>
-          <a:p>
-            <a:pPr lvl="1">
-              <a:buSzPct val="45000"/>
-              <a:buFont typeface="StarSymbol"/>
-              <a:buChar char=""/>
-            </a:pPr>
-            <a:r>
-              <a:rPr lang="en-GB"/>
-              <a:t>Stock market is complex, so needs to be modelled, which neural networks do a good job of</a:t>
-            </a:r>
-            <a:endParaRPr/>
-          </a:p>
-          <a:p>
-            <a:pPr>
-              <a:buSzPct val="45000"/>
-              <a:buFont typeface="StarSymbol"/>
-              <a:buChar char=""/>
-            </a:pPr>
-            <a:r>
-              <a:rPr lang="en-GB"/>
-              <a:t>Learning algorithm</a:t>
-            </a:r>
-            <a:endParaRPr/>
-          </a:p>
-          <a:p>
-            <a:pPr lvl="1">
-              <a:buSzPct val="45000"/>
-              <a:buFont typeface="StarSymbol"/>
-              <a:buChar char=""/>
-            </a:pPr>
-            <a:r>
-              <a:rPr lang="en-GB"/>
-              <a:t>Backpropagation popular since they are good at generalizing and easy to implement, however the optimal network configuration is hard to work out</a:t>
-            </a:r>
-            <a:endParaRPr/>
-          </a:p>
-          <a:p>
-            <a:pPr lvl="1">
-              <a:buSzPct val="45000"/>
-              <a:buFont typeface="StarSymbol"/>
-              <a:buChar char=""/>
-            </a:pPr>
-            <a:r>
-              <a:rPr lang="en-GB"/>
-              <a:t>Recurrence/self-organising networks also used</a:t>
+            <a:r>
+              <a:rPr lang="en-GB"/>
+              <a:t>So first of all, why do we need neural networks for stock market prediction. Well, current methods involve a lot of analysis to find patters in the data, which neural networks are quite good at in the first place. They're also pretty adept at finding non-linear patterns which are quite hard to spot.</a:t>
+            </a:r>
+            <a:endParaRPr/>
+          </a:p>
+          <a:p>
+            <a:r>
+              <a:rPr lang="en-GB"/>
+              <a:t>When designing the network you have to look at how many input neurons to use, since stock markets are quite complex and have many factors affecting them. You also have to look at which learning algorithm is most ideal; back propagation can once again be used since its fairly easy to implement and is effective, but there are other methods such as recurrence and self-organising networks.</a:t>
             </a:r>
             <a:endParaRPr/>
           </a:p>
@@ -1750,7 +1785,7 @@
           <a:bodyPr bIns="0" lIns="0" rIns="0" tIns="0" wrap="none"/>
           <a:p>
             <a:pPr algn="r"/>
-            <a:fld id="{286F34B4-127D-483E-B52E-DF7398316324}" type="slidenum">
+            <a:fld id="{6B352475-685C-4498-8621-19F66A926C49}" type="slidenum">
               <a:rPr lang="en-GB" sz="1400"/>
               <a:t>&lt;number&gt;</a:t>
             </a:fld>
@@ -1836,17 +1871,111 @@
         </p:blipFill>
         <p:spPr>
           <a:xfrm>
-            <a:off x="5989320" y="1717560"/>
-            <a:ext cx="2650680" cy="4294440"/>
+            <a:off x="900000" y="3996000"/>
+            <a:ext cx="3960000" cy="1980000"/>
           </a:xfrm>
           <a:prstGeom prst="rect">
             <a:avLst/>
           </a:prstGeom>
         </p:spPr>
       </p:pic>
+      <p:sp>
+        <p:nvSpPr>
+          <p:cNvPr id="44" name="TextShape 2"/>
+          <p:cNvSpPr txBox="1"/>
+          <p:nvPr/>
+        </p:nvSpPr>
+        <p:spPr>
+          <a:xfrm>
+            <a:off x="1440000" y="3564000"/>
+            <a:ext cx="2808000" cy="346320"/>
+          </a:xfrm>
+          <a:prstGeom prst="rect">
+            <a:avLst/>
+          </a:prstGeom>
+        </p:spPr>
+        <p:txBody>
+          <a:bodyPr bIns="45000" lIns="90000" rIns="90000" tIns="45000" wrap="none"/>
+          <a:p>
+            <a:r>
+              <a:rPr b="1" lang="en-GB"/>
+              <a:t>Stock market prediction</a:t>
+            </a:r>
+            <a:endParaRPr/>
+          </a:p>
+        </p:txBody>
+      </p:sp>
+      <p:sp>
+        <p:nvSpPr>
+          <p:cNvPr id="45" name="TextShape 3"/>
+          <p:cNvSpPr txBox="1"/>
+          <p:nvPr/>
+        </p:nvSpPr>
+        <p:spPr>
+          <a:xfrm>
+            <a:off x="1152000" y="6048000"/>
+            <a:ext cx="3312000" cy="427320"/>
+          </a:xfrm>
+          <a:prstGeom prst="rect">
+            <a:avLst/>
+          </a:prstGeom>
+        </p:spPr>
+      </p:sp>
+      <p:sp>
+        <p:nvSpPr>
+          <p:cNvPr id="46" name="TextShape 4"/>
+          <p:cNvSpPr txBox="1"/>
+          <p:nvPr/>
+        </p:nvSpPr>
+        <p:spPr>
+          <a:xfrm>
+            <a:off x="1152000" y="6120000"/>
+            <a:ext cx="3420000" cy="346320"/>
+          </a:xfrm>
+          <a:prstGeom prst="rect">
+            <a:avLst/>
+          </a:prstGeom>
+        </p:spPr>
+        <p:txBody>
+          <a:bodyPr bIns="45000" lIns="90000" rIns="90000" tIns="45000" wrap="none"/>
+          <a:p>
+            <a:r>
+              <a:rPr b="1" lang="en-GB"/>
+              <a:t>Optical character recognition</a:t>
+            </a:r>
+            <a:endParaRPr/>
+          </a:p>
+        </p:txBody>
+      </p:sp>
+      <p:sp>
+        <p:nvSpPr>
+          <p:cNvPr id="47" name="TextShape 5"/>
+          <p:cNvSpPr txBox="1"/>
+          <p:nvPr/>
+        </p:nvSpPr>
+        <p:spPr>
+          <a:xfrm>
+            <a:off x="6120000" y="5256000"/>
+            <a:ext cx="2520000" cy="346320"/>
+          </a:xfrm>
+          <a:prstGeom prst="rect">
+            <a:avLst/>
+          </a:prstGeom>
+        </p:spPr>
+        <p:txBody>
+          <a:bodyPr bIns="45000" lIns="90000" rIns="90000" tIns="45000" wrap="none"/>
+          <a:p>
+            <a:r>
+              <a:rPr b="1" lang="en-GB"/>
+              <a:t>Image compression</a:t>
+            </a:r>
+            <a:endParaRPr/>
+          </a:p>
+        </p:txBody>
+      </p:sp>
       <p:pic>
         <p:nvPicPr>
-          <p:cNvPr descr="" id="44" name=""/>
+          <p:cNvPr descr="" id="48" name=""/>
           <p:cNvPicPr/>
           <p:nvPr/>
         </p:nvPicPr>
@@ -1858,108 +1987,14 @@
         </p:blipFill>
         <p:spPr>
           <a:xfrm>
-            <a:off x="792000" y="3996000"/>
-            <a:ext cx="3960000" cy="1980000"/>
+            <a:off x="1009440" y="1656000"/>
+            <a:ext cx="3632760" cy="1872000"/>
           </a:xfrm>
           <a:prstGeom prst="rect">
             <a:avLst/>
           </a:prstGeom>
         </p:spPr>
       </p:pic>
-      <p:sp>
-        <p:nvSpPr>
-          <p:cNvPr id="45" name="TextShape 2"/>
-          <p:cNvSpPr txBox="1"/>
-          <p:nvPr/>
-        </p:nvSpPr>
-        <p:spPr>
-          <a:xfrm>
-            <a:off x="1440000" y="3564000"/>
-            <a:ext cx="2808000" cy="346320"/>
-          </a:xfrm>
-          <a:prstGeom prst="rect">
-            <a:avLst/>
-          </a:prstGeom>
-        </p:spPr>
-        <p:txBody>
-          <a:bodyPr bIns="45000" lIns="90000" rIns="90000" tIns="45000" wrap="none"/>
-          <a:p>
-            <a:r>
-              <a:rPr b="1" lang="en-GB"/>
-              <a:t>Stock market prediction</a:t>
-            </a:r>
-            <a:endParaRPr/>
-          </a:p>
-        </p:txBody>
-      </p:sp>
-      <p:sp>
-        <p:nvSpPr>
-          <p:cNvPr id="46" name="TextShape 3"/>
-          <p:cNvSpPr txBox="1"/>
-          <p:nvPr/>
-        </p:nvSpPr>
-        <p:spPr>
-          <a:xfrm>
-            <a:off x="1152000" y="6048000"/>
-            <a:ext cx="3312000" cy="427320"/>
-          </a:xfrm>
-          <a:prstGeom prst="rect">
-            <a:avLst/>
-          </a:prstGeom>
-        </p:spPr>
-      </p:sp>
-      <p:sp>
-        <p:nvSpPr>
-          <p:cNvPr id="47" name="TextShape 4"/>
-          <p:cNvSpPr txBox="1"/>
-          <p:nvPr/>
-        </p:nvSpPr>
-        <p:spPr>
-          <a:xfrm>
-            <a:off x="1152000" y="6120000"/>
-            <a:ext cx="3420000" cy="346320"/>
-          </a:xfrm>
-          <a:prstGeom prst="rect">
-            <a:avLst/>
-          </a:prstGeom>
-        </p:spPr>
-        <p:txBody>
-          <a:bodyPr bIns="45000" lIns="90000" rIns="90000" tIns="45000" wrap="none"/>
-          <a:p>
-            <a:r>
-              <a:rPr b="1" lang="en-GB"/>
-              <a:t>Optical character recognition</a:t>
-            </a:r>
-            <a:endParaRPr/>
-          </a:p>
-        </p:txBody>
-      </p:sp>
-      <p:sp>
-        <p:nvSpPr>
-          <p:cNvPr id="48" name="TextShape 5"/>
-          <p:cNvSpPr txBox="1"/>
-          <p:nvPr/>
-        </p:nvSpPr>
-        <p:spPr>
-          <a:xfrm>
-            <a:off x="6156000" y="6156000"/>
-            <a:ext cx="2520000" cy="346320"/>
-          </a:xfrm>
-          <a:prstGeom prst="rect">
-            <a:avLst/>
-          </a:prstGeom>
-        </p:spPr>
-        <p:txBody>
-          <a:bodyPr bIns="45000" lIns="90000" rIns="90000" tIns="45000" wrap="none"/>
-          <a:p>
-            <a:r>
-              <a:rPr b="1" lang="en-GB"/>
-              <a:t>Image compression</a:t>
-            </a:r>
-            <a:endParaRPr/>
-          </a:p>
-        </p:txBody>
-      </p:sp>
       <p:pic>
         <p:nvPicPr>
           <p:cNvPr descr="" id="49" name=""/>
@@ -1974,8 +2009,8 @@
         </p:blipFill>
         <p:spPr>
           <a:xfrm>
-            <a:off x="1009440" y="1656000"/>
-            <a:ext cx="3632760" cy="1872000"/>
+            <a:off x="5303880" y="2016000"/>
+            <a:ext cx="4200120" cy="3171600"/>
           </a:xfrm>
           <a:prstGeom prst="rect">
             <a:avLst/>
@@ -2288,7 +2323,7 @@
         <p:spPr>
           <a:xfrm>
             <a:off x="504000" y="1769040"/>
-            <a:ext cx="8870040" cy="4384440"/>
+            <a:ext cx="8870040" cy="4384800"/>
           </a:xfrm>
           <a:prstGeom prst="rect">
             <a:avLst/>
@@ -2461,6 +2496,18 @@
             <a:endParaRPr/>
           </a:p>
           <a:p>
+            <a:pPr lvl="1">
+              <a:buSzPct val="75000"/>
+              <a:buFont typeface="StarSymbol"/>
+              <a:buChar char=""/>
+            </a:pPr>
+            <a:r>
+              <a:rPr lang="en-GB"/>
+              <a:t>Has several learning algorithms that can be used</a:t>
+            </a:r>
+            <a:endParaRPr/>
+          </a:p>
+          <a:p>
             <a:pPr>
               <a:buSzPct val="45000"/>
               <a:buFont typeface="StarSymbol"/>
@@ -2468,43 +2515,7 @@
             </a:pPr>
             <a:r>
               <a:rPr lang="en-GB"/>
-              <a:t>Has several learning algorithms that can be used</a:t>
-            </a:r>
-            <a:endParaRPr/>
-          </a:p>
-          <a:p>
-            <a:pPr lvl="1">
-              <a:buSzPct val="75000"/>
-              <a:buFont typeface="StarSymbol"/>
-              <a:buChar char=""/>
-            </a:pPr>
-            <a:r>
-              <a:rPr lang="en-GB"/>
-              <a:t>Competitive learning</a:t>
-            </a:r>
-            <a:endParaRPr/>
-          </a:p>
-          <a:p>
-            <a:pPr lvl="1">
-              <a:buSzPct val="75000"/>
-              <a:buFont typeface="StarSymbol"/>
-              <a:buChar char=""/>
-            </a:pPr>
-            <a:r>
-              <a:rPr lang="en-GB"/>
-              <a:t>Kohonen self-organising feature map</a:t>
-            </a:r>
-            <a:endParaRPr/>
-          </a:p>
-          <a:p>
-            <a:pPr lvl="1">
-              <a:buSzPct val="75000"/>
-              <a:buFont typeface="StarSymbol"/>
-              <a:buChar char=""/>
-            </a:pPr>
-            <a:r>
-              <a:rPr lang="en-GB"/>
-              <a:t>Frequency sensitive competitive learning</a:t>
+              <a:t>There are other ways of compressing images with neural networks</a:t>
             </a:r>
             <a:endParaRPr/>
           </a:p>

</xml_diff>